<commit_message>
Servlets day 2 done
</commit_message>
<xml_diff>
--- a/Servlets/Day 2/Docs/Web Presentation-Part2.pptx
+++ b/Servlets/Day 2/Docs/Web Presentation-Part2.pptx
@@ -24,7 +24,7 @@
     <p:sldId id="342" r:id="rId18"/>
     <p:sldId id="343" r:id="rId19"/>
     <p:sldId id="303" r:id="rId20"/>
-    <p:sldId id="344" r:id="rId21"/>
+    <p:sldId id="349" r:id="rId21"/>
     <p:sldId id="324" r:id="rId22"/>
     <p:sldId id="346" r:id="rId23"/>
     <p:sldId id="305" r:id="rId24"/>
@@ -254,7 +254,7 @@
             <a:fld id="{4F94E7C4-328C-457B-8CA2-EE381C323794}" type="datetimeFigureOut">
               <a:rPr lang="en-US" smtClean="0"/>
               <a:pPr/>
-              <a:t>7/11/2016</a:t>
+              <a:t>7/13/2016</a:t>
             </a:fld>
             <a:endParaRPr lang="en-US"/>
           </a:p>
@@ -821,7 +821,7 @@
     </p:spTree>
     <p:extLst>
       <p:ext uri="{BB962C8B-B14F-4D97-AF65-F5344CB8AC3E}">
-        <p14:creationId xmlns:p14="http://schemas.microsoft.com/office/powerpoint/2010/main" val="3188898580"/>
+        <p14:creationId xmlns:p14="http://schemas.microsoft.com/office/powerpoint/2010/main" val="78853598"/>
       </p:ext>
     </p:extLst>
   </p:cSld>
@@ -5283,7 +5283,7 @@
             <a:fld id="{0DDD1723-F08C-BC4A-A158-087EDAF93B47}" type="datetimeFigureOut">
               <a:rPr lang="en-US"/>
               <a:pPr/>
-              <a:t>7/11/2016</a:t>
+              <a:t>7/13/2016</a:t>
             </a:fld>
             <a:endParaRPr lang="en-US"/>
           </a:p>
@@ -6486,13 +6486,6 @@
               </a:rPr>
               <a:t>Need to perform some basic validations</a:t>
             </a:r>
-            <a:endParaRPr lang="en-US" altLang="en-US" sz="1600" b="1" dirty="0">
-              <a:solidFill>
-                <a:srgbClr val="000000"/>
-              </a:solidFill>
-              <a:latin typeface="Trebuchet MS" panose="020B0603020202020204" pitchFamily="34" charset="0"/>
-              <a:cs typeface="Arial" panose="020B0604020202020204" pitchFamily="34" charset="0"/>
-            </a:endParaRPr>
           </a:p>
         </p:txBody>
       </p:sp>
@@ -6782,11 +6775,7 @@
           <a:p>
             <a:r>
               <a:rPr lang="en-US" dirty="0" smtClean="0"/>
-              <a:t>Example </a:t>
-            </a:r>
-            <a:r>
-              <a:rPr lang="en-US" dirty="0" smtClean="0"/>
-              <a:t>of </a:t>
+              <a:t>Example of </a:t>
             </a:r>
             <a:r>
               <a:rPr lang="en-US" b="1" dirty="0" smtClean="0"/>
@@ -7433,9 +7422,6 @@
               </a:rPr>
               <a:t>Need to print some text onto the page</a:t>
             </a:r>
-            <a:endParaRPr lang="en-US" altLang="en-US" b="1" dirty="0">
-              <a:latin typeface="Trebuchet MS" panose="020B0603020202020204" pitchFamily="34" charset="0"/>
-            </a:endParaRPr>
           </a:p>
         </p:txBody>
       </p:sp>
@@ -7482,11 +7468,7 @@
           <a:p>
             <a:r>
               <a:rPr lang="en-US" dirty="0" smtClean="0"/>
-              <a:t>JSP - </a:t>
-            </a:r>
-            <a:r>
-              <a:rPr lang="en-US" dirty="0" smtClean="0"/>
-              <a:t>Expressions</a:t>
+              <a:t>JSP - Expressions</a:t>
             </a:r>
             <a:endParaRPr lang="ro-RO" dirty="0"/>
           </a:p>
@@ -7914,11 +7896,7 @@
           <a:p>
             <a:r>
               <a:rPr lang="en-US" dirty="0" smtClean="0"/>
-              <a:t>JSP - </a:t>
-            </a:r>
-            <a:r>
-              <a:rPr lang="en-US" dirty="0" smtClean="0"/>
-              <a:t>Expressions</a:t>
+              <a:t>JSP - Expressions</a:t>
             </a:r>
             <a:endParaRPr lang="ro-RO" dirty="0"/>
           </a:p>
@@ -8374,9 +8352,6 @@
               </a:rPr>
               <a:t>Provide tag libraries</a:t>
             </a:r>
-            <a:endParaRPr lang="en-US" altLang="en-US" b="1" dirty="0">
-              <a:latin typeface="Trebuchet MS" panose="020B0603020202020204" pitchFamily="34" charset="0"/>
-            </a:endParaRPr>
           </a:p>
         </p:txBody>
       </p:sp>
@@ -8423,11 +8398,7 @@
           <a:p>
             <a:r>
               <a:rPr lang="en-US" dirty="0" smtClean="0"/>
-              <a:t>JSP - </a:t>
-            </a:r>
-            <a:r>
-              <a:rPr lang="en-US" dirty="0" smtClean="0"/>
-              <a:t>Directives</a:t>
+              <a:t>JSP - Directives</a:t>
             </a:r>
             <a:endParaRPr lang="ro-RO" dirty="0"/>
           </a:p>
@@ -8688,11 +8659,7 @@
           <a:p>
             <a:r>
               <a:rPr lang="en-US" dirty="0" smtClean="0"/>
-              <a:t>Page </a:t>
-            </a:r>
-            <a:r>
-              <a:rPr lang="en-US" dirty="0" smtClean="0"/>
-              <a:t>directive</a:t>
+              <a:t>Page directive</a:t>
             </a:r>
           </a:p>
           <a:p>
@@ -8810,11 +8777,7 @@
           <a:p>
             <a:r>
               <a:rPr lang="en-US" dirty="0" smtClean="0"/>
-              <a:t>JSP - </a:t>
-            </a:r>
-            <a:r>
-              <a:rPr lang="en-US" dirty="0" smtClean="0"/>
-              <a:t>Directives</a:t>
+              <a:t>JSP - Directives</a:t>
             </a:r>
             <a:endParaRPr lang="ro-RO" dirty="0"/>
           </a:p>
@@ -10197,7 +10160,7 @@
           </a:xfrm>
           <a:prstGeom prst="curvedConnector3">
             <a:avLst>
-              <a:gd name="adj1" fmla="val 50000"/>
+              <a:gd name="adj1" fmla="val 62226"/>
             </a:avLst>
           </a:prstGeom>
           <a:noFill/>
@@ -10940,10 +10903,816 @@
           </a:p>
         </p:txBody>
       </p:sp>
+      <p:sp>
+        <p:nvSpPr>
+          <p:cNvPr id="13" name="Rectangle 12"/>
+          <p:cNvSpPr>
+            <a:spLocks noChangeArrowheads="1"/>
+          </p:cNvSpPr>
+          <p:nvPr/>
+        </p:nvSpPr>
+        <p:spPr bwMode="auto">
+          <a:xfrm>
+            <a:off x="419986" y="3248327"/>
+            <a:ext cx="1653363" cy="214626"/>
+          </a:xfrm>
+          <a:prstGeom prst="rect">
+            <a:avLst/>
+          </a:prstGeom>
+          <a:noFill/>
+          <a:ln w="9525">
+            <a:solidFill>
+              <a:schemeClr val="tx1"/>
+            </a:solidFill>
+            <a:miter lim="800000"/>
+            <a:headEnd/>
+            <a:tailEnd/>
+          </a:ln>
+          <a:effectLst/>
+          <a:extLst>
+            <a:ext uri="{909E8E84-426E-40DD-AFC4-6F175D3DCCD1}">
+              <a14:hiddenFill xmlns:a14="http://schemas.microsoft.com/office/drawing/2010/main">
+                <a:solidFill>
+                  <a:schemeClr val="accent1"/>
+                </a:solidFill>
+              </a14:hiddenFill>
+            </a:ext>
+            <a:ext uri="{AF507438-7753-43E0-B8FC-AC1667EBCBE1}">
+              <a14:hiddenEffects xmlns:a14="http://schemas.microsoft.com/office/drawing/2010/main">
+                <a:effectLst>
+                  <a:outerShdw dist="35921" dir="2700000" algn="ctr" rotWithShape="0">
+                    <a:schemeClr val="bg2"/>
+                  </a:outerShdw>
+                </a:effectLst>
+              </a14:hiddenEffects>
+            </a:ext>
+          </a:extLst>
+        </p:spPr>
+        <p:txBody>
+          <a:bodyPr wrap="none" anchor="ctr"/>
+          <a:lstStyle>
+            <a:defPPr>
+              <a:defRPr lang="en-US"/>
+            </a:defPPr>
+            <a:lvl1pPr algn="l" rtl="0" fontAlgn="base">
+              <a:spcBef>
+                <a:spcPct val="0"/>
+              </a:spcBef>
+              <a:spcAft>
+                <a:spcPct val="0"/>
+              </a:spcAft>
+              <a:defRPr kern="1200">
+                <a:solidFill>
+                  <a:schemeClr val="tx1"/>
+                </a:solidFill>
+                <a:latin typeface="Arial" panose="020B0604020202020204" pitchFamily="34" charset="0"/>
+                <a:ea typeface="+mn-ea"/>
+                <a:cs typeface="Arial" panose="020B0604020202020204" pitchFamily="34" charset="0"/>
+              </a:defRPr>
+            </a:lvl1pPr>
+            <a:lvl2pPr marL="457200" algn="l" rtl="0" fontAlgn="base">
+              <a:spcBef>
+                <a:spcPct val="0"/>
+              </a:spcBef>
+              <a:spcAft>
+                <a:spcPct val="0"/>
+              </a:spcAft>
+              <a:defRPr kern="1200">
+                <a:solidFill>
+                  <a:schemeClr val="tx1"/>
+                </a:solidFill>
+                <a:latin typeface="Arial" panose="020B0604020202020204" pitchFamily="34" charset="0"/>
+                <a:ea typeface="+mn-ea"/>
+                <a:cs typeface="Arial" panose="020B0604020202020204" pitchFamily="34" charset="0"/>
+              </a:defRPr>
+            </a:lvl2pPr>
+            <a:lvl3pPr marL="914400" algn="l" rtl="0" fontAlgn="base">
+              <a:spcBef>
+                <a:spcPct val="0"/>
+              </a:spcBef>
+              <a:spcAft>
+                <a:spcPct val="0"/>
+              </a:spcAft>
+              <a:defRPr kern="1200">
+                <a:solidFill>
+                  <a:schemeClr val="tx1"/>
+                </a:solidFill>
+                <a:latin typeface="Arial" panose="020B0604020202020204" pitchFamily="34" charset="0"/>
+                <a:ea typeface="+mn-ea"/>
+                <a:cs typeface="Arial" panose="020B0604020202020204" pitchFamily="34" charset="0"/>
+              </a:defRPr>
+            </a:lvl3pPr>
+            <a:lvl4pPr marL="1371600" algn="l" rtl="0" fontAlgn="base">
+              <a:spcBef>
+                <a:spcPct val="0"/>
+              </a:spcBef>
+              <a:spcAft>
+                <a:spcPct val="0"/>
+              </a:spcAft>
+              <a:defRPr kern="1200">
+                <a:solidFill>
+                  <a:schemeClr val="tx1"/>
+                </a:solidFill>
+                <a:latin typeface="Arial" panose="020B0604020202020204" pitchFamily="34" charset="0"/>
+                <a:ea typeface="+mn-ea"/>
+                <a:cs typeface="Arial" panose="020B0604020202020204" pitchFamily="34" charset="0"/>
+              </a:defRPr>
+            </a:lvl4pPr>
+            <a:lvl5pPr marL="1828800" algn="l" rtl="0" fontAlgn="base">
+              <a:spcBef>
+                <a:spcPct val="0"/>
+              </a:spcBef>
+              <a:spcAft>
+                <a:spcPct val="0"/>
+              </a:spcAft>
+              <a:defRPr kern="1200">
+                <a:solidFill>
+                  <a:schemeClr val="tx1"/>
+                </a:solidFill>
+                <a:latin typeface="Arial" panose="020B0604020202020204" pitchFamily="34" charset="0"/>
+                <a:ea typeface="+mn-ea"/>
+                <a:cs typeface="Arial" panose="020B0604020202020204" pitchFamily="34" charset="0"/>
+              </a:defRPr>
+            </a:lvl5pPr>
+            <a:lvl6pPr marL="2286000" algn="l" defTabSz="914400" rtl="0" eaLnBrk="1" latinLnBrk="0" hangingPunct="1">
+              <a:defRPr kern="1200">
+                <a:solidFill>
+                  <a:schemeClr val="tx1"/>
+                </a:solidFill>
+                <a:latin typeface="Arial" panose="020B0604020202020204" pitchFamily="34" charset="0"/>
+                <a:ea typeface="+mn-ea"/>
+                <a:cs typeface="Arial" panose="020B0604020202020204" pitchFamily="34" charset="0"/>
+              </a:defRPr>
+            </a:lvl6pPr>
+            <a:lvl7pPr marL="2743200" algn="l" defTabSz="914400" rtl="0" eaLnBrk="1" latinLnBrk="0" hangingPunct="1">
+              <a:defRPr kern="1200">
+                <a:solidFill>
+                  <a:schemeClr val="tx1"/>
+                </a:solidFill>
+                <a:latin typeface="Arial" panose="020B0604020202020204" pitchFamily="34" charset="0"/>
+                <a:ea typeface="+mn-ea"/>
+                <a:cs typeface="Arial" panose="020B0604020202020204" pitchFamily="34" charset="0"/>
+              </a:defRPr>
+            </a:lvl7pPr>
+            <a:lvl8pPr marL="3200400" algn="l" defTabSz="914400" rtl="0" eaLnBrk="1" latinLnBrk="0" hangingPunct="1">
+              <a:defRPr kern="1200">
+                <a:solidFill>
+                  <a:schemeClr val="tx1"/>
+                </a:solidFill>
+                <a:latin typeface="Arial" panose="020B0604020202020204" pitchFamily="34" charset="0"/>
+                <a:ea typeface="+mn-ea"/>
+                <a:cs typeface="Arial" panose="020B0604020202020204" pitchFamily="34" charset="0"/>
+              </a:defRPr>
+            </a:lvl8pPr>
+            <a:lvl9pPr marL="3657600" algn="l" defTabSz="914400" rtl="0" eaLnBrk="1" latinLnBrk="0" hangingPunct="1">
+              <a:defRPr kern="1200">
+                <a:solidFill>
+                  <a:schemeClr val="tx1"/>
+                </a:solidFill>
+                <a:latin typeface="Arial" panose="020B0604020202020204" pitchFamily="34" charset="0"/>
+                <a:ea typeface="+mn-ea"/>
+                <a:cs typeface="Arial" panose="020B0604020202020204" pitchFamily="34" charset="0"/>
+              </a:defRPr>
+            </a:lvl9pPr>
+          </a:lstStyle>
+          <a:p>
+            <a:pPr eaLnBrk="1" hangingPunct="1"/>
+            <a:endParaRPr lang="en-IN" altLang="en-US"/>
+          </a:p>
+        </p:txBody>
+      </p:sp>
+      <p:cxnSp>
+        <p:nvCxnSpPr>
+          <p:cNvPr id="17" name="AutoShape 11"/>
+          <p:cNvCxnSpPr>
+            <a:cxnSpLocks noChangeShapeType="1"/>
+            <a:stCxn id="13" idx="3"/>
+            <a:endCxn id="19" idx="1"/>
+          </p:cNvCxnSpPr>
+          <p:nvPr/>
+        </p:nvCxnSpPr>
+        <p:spPr bwMode="auto">
+          <a:xfrm>
+            <a:off x="2073349" y="3355640"/>
+            <a:ext cx="3241158" cy="1463001"/>
+          </a:xfrm>
+          <a:prstGeom prst="curvedConnector3">
+            <a:avLst>
+              <a:gd name="adj1" fmla="val 50000"/>
+            </a:avLst>
+          </a:prstGeom>
+          <a:noFill/>
+          <a:ln w="9525">
+            <a:solidFill>
+              <a:schemeClr val="tx1"/>
+            </a:solidFill>
+            <a:round/>
+            <a:headEnd/>
+            <a:tailEnd type="triangle" w="med" len="med"/>
+          </a:ln>
+          <a:effectLst/>
+          <a:extLst>
+            <a:ext uri="{909E8E84-426E-40DD-AFC4-6F175D3DCCD1}">
+              <a14:hiddenFill xmlns:a14="http://schemas.microsoft.com/office/drawing/2010/main">
+                <a:noFill/>
+              </a14:hiddenFill>
+            </a:ext>
+            <a:ext uri="{AF507438-7753-43E0-B8FC-AC1667EBCBE1}">
+              <a14:hiddenEffects xmlns:a14="http://schemas.microsoft.com/office/drawing/2010/main">
+                <a:effectLst>
+                  <a:outerShdw dist="35921" dir="2700000" algn="ctr" rotWithShape="0">
+                    <a:schemeClr val="bg2"/>
+                  </a:outerShdw>
+                </a:effectLst>
+              </a14:hiddenEffects>
+            </a:ext>
+          </a:extLst>
+        </p:spPr>
+      </p:cxnSp>
+      <p:sp>
+        <p:nvSpPr>
+          <p:cNvPr id="19" name="Rectangle 18"/>
+          <p:cNvSpPr>
+            <a:spLocks noChangeArrowheads="1"/>
+          </p:cNvSpPr>
+          <p:nvPr/>
+        </p:nvSpPr>
+        <p:spPr bwMode="auto">
+          <a:xfrm>
+            <a:off x="5314507" y="4711329"/>
+            <a:ext cx="937437" cy="214624"/>
+          </a:xfrm>
+          <a:prstGeom prst="rect">
+            <a:avLst/>
+          </a:prstGeom>
+          <a:noFill/>
+          <a:ln w="9525">
+            <a:solidFill>
+              <a:schemeClr val="tx1"/>
+            </a:solidFill>
+            <a:miter lim="800000"/>
+            <a:headEnd/>
+            <a:tailEnd/>
+          </a:ln>
+          <a:effectLst/>
+          <a:extLst>
+            <a:ext uri="{909E8E84-426E-40DD-AFC4-6F175D3DCCD1}">
+              <a14:hiddenFill xmlns:a14="http://schemas.microsoft.com/office/drawing/2010/main">
+                <a:solidFill>
+                  <a:schemeClr val="accent1"/>
+                </a:solidFill>
+              </a14:hiddenFill>
+            </a:ext>
+            <a:ext uri="{AF507438-7753-43E0-B8FC-AC1667EBCBE1}">
+              <a14:hiddenEffects xmlns:a14="http://schemas.microsoft.com/office/drawing/2010/main">
+                <a:effectLst>
+                  <a:outerShdw dist="35921" dir="2700000" algn="ctr" rotWithShape="0">
+                    <a:schemeClr val="bg2"/>
+                  </a:outerShdw>
+                </a:effectLst>
+              </a14:hiddenEffects>
+            </a:ext>
+          </a:extLst>
+        </p:spPr>
+        <p:txBody>
+          <a:bodyPr wrap="none" anchor="ctr"/>
+          <a:lstStyle>
+            <a:defPPr>
+              <a:defRPr lang="en-US"/>
+            </a:defPPr>
+            <a:lvl1pPr algn="l" rtl="0" fontAlgn="base">
+              <a:spcBef>
+                <a:spcPct val="0"/>
+              </a:spcBef>
+              <a:spcAft>
+                <a:spcPct val="0"/>
+              </a:spcAft>
+              <a:defRPr kern="1200">
+                <a:solidFill>
+                  <a:schemeClr val="tx1"/>
+                </a:solidFill>
+                <a:latin typeface="Arial" panose="020B0604020202020204" pitchFamily="34" charset="0"/>
+                <a:ea typeface="+mn-ea"/>
+                <a:cs typeface="Arial" panose="020B0604020202020204" pitchFamily="34" charset="0"/>
+              </a:defRPr>
+            </a:lvl1pPr>
+            <a:lvl2pPr marL="457200" algn="l" rtl="0" fontAlgn="base">
+              <a:spcBef>
+                <a:spcPct val="0"/>
+              </a:spcBef>
+              <a:spcAft>
+                <a:spcPct val="0"/>
+              </a:spcAft>
+              <a:defRPr kern="1200">
+                <a:solidFill>
+                  <a:schemeClr val="tx1"/>
+                </a:solidFill>
+                <a:latin typeface="Arial" panose="020B0604020202020204" pitchFamily="34" charset="0"/>
+                <a:ea typeface="+mn-ea"/>
+                <a:cs typeface="Arial" panose="020B0604020202020204" pitchFamily="34" charset="0"/>
+              </a:defRPr>
+            </a:lvl2pPr>
+            <a:lvl3pPr marL="914400" algn="l" rtl="0" fontAlgn="base">
+              <a:spcBef>
+                <a:spcPct val="0"/>
+              </a:spcBef>
+              <a:spcAft>
+                <a:spcPct val="0"/>
+              </a:spcAft>
+              <a:defRPr kern="1200">
+                <a:solidFill>
+                  <a:schemeClr val="tx1"/>
+                </a:solidFill>
+                <a:latin typeface="Arial" panose="020B0604020202020204" pitchFamily="34" charset="0"/>
+                <a:ea typeface="+mn-ea"/>
+                <a:cs typeface="Arial" panose="020B0604020202020204" pitchFamily="34" charset="0"/>
+              </a:defRPr>
+            </a:lvl3pPr>
+            <a:lvl4pPr marL="1371600" algn="l" rtl="0" fontAlgn="base">
+              <a:spcBef>
+                <a:spcPct val="0"/>
+              </a:spcBef>
+              <a:spcAft>
+                <a:spcPct val="0"/>
+              </a:spcAft>
+              <a:defRPr kern="1200">
+                <a:solidFill>
+                  <a:schemeClr val="tx1"/>
+                </a:solidFill>
+                <a:latin typeface="Arial" panose="020B0604020202020204" pitchFamily="34" charset="0"/>
+                <a:ea typeface="+mn-ea"/>
+                <a:cs typeface="Arial" panose="020B0604020202020204" pitchFamily="34" charset="0"/>
+              </a:defRPr>
+            </a:lvl4pPr>
+            <a:lvl5pPr marL="1828800" algn="l" rtl="0" fontAlgn="base">
+              <a:spcBef>
+                <a:spcPct val="0"/>
+              </a:spcBef>
+              <a:spcAft>
+                <a:spcPct val="0"/>
+              </a:spcAft>
+              <a:defRPr kern="1200">
+                <a:solidFill>
+                  <a:schemeClr val="tx1"/>
+                </a:solidFill>
+                <a:latin typeface="Arial" panose="020B0604020202020204" pitchFamily="34" charset="0"/>
+                <a:ea typeface="+mn-ea"/>
+                <a:cs typeface="Arial" panose="020B0604020202020204" pitchFamily="34" charset="0"/>
+              </a:defRPr>
+            </a:lvl5pPr>
+            <a:lvl6pPr marL="2286000" algn="l" defTabSz="914400" rtl="0" eaLnBrk="1" latinLnBrk="0" hangingPunct="1">
+              <a:defRPr kern="1200">
+                <a:solidFill>
+                  <a:schemeClr val="tx1"/>
+                </a:solidFill>
+                <a:latin typeface="Arial" panose="020B0604020202020204" pitchFamily="34" charset="0"/>
+                <a:ea typeface="+mn-ea"/>
+                <a:cs typeface="Arial" panose="020B0604020202020204" pitchFamily="34" charset="0"/>
+              </a:defRPr>
+            </a:lvl6pPr>
+            <a:lvl7pPr marL="2743200" algn="l" defTabSz="914400" rtl="0" eaLnBrk="1" latinLnBrk="0" hangingPunct="1">
+              <a:defRPr kern="1200">
+                <a:solidFill>
+                  <a:schemeClr val="tx1"/>
+                </a:solidFill>
+                <a:latin typeface="Arial" panose="020B0604020202020204" pitchFamily="34" charset="0"/>
+                <a:ea typeface="+mn-ea"/>
+                <a:cs typeface="Arial" panose="020B0604020202020204" pitchFamily="34" charset="0"/>
+              </a:defRPr>
+            </a:lvl7pPr>
+            <a:lvl8pPr marL="3200400" algn="l" defTabSz="914400" rtl="0" eaLnBrk="1" latinLnBrk="0" hangingPunct="1">
+              <a:defRPr kern="1200">
+                <a:solidFill>
+                  <a:schemeClr val="tx1"/>
+                </a:solidFill>
+                <a:latin typeface="Arial" panose="020B0604020202020204" pitchFamily="34" charset="0"/>
+                <a:ea typeface="+mn-ea"/>
+                <a:cs typeface="Arial" panose="020B0604020202020204" pitchFamily="34" charset="0"/>
+              </a:defRPr>
+            </a:lvl8pPr>
+            <a:lvl9pPr marL="3657600" algn="l" defTabSz="914400" rtl="0" eaLnBrk="1" latinLnBrk="0" hangingPunct="1">
+              <a:defRPr kern="1200">
+                <a:solidFill>
+                  <a:schemeClr val="tx1"/>
+                </a:solidFill>
+                <a:latin typeface="Arial" panose="020B0604020202020204" pitchFamily="34" charset="0"/>
+                <a:ea typeface="+mn-ea"/>
+                <a:cs typeface="Arial" panose="020B0604020202020204" pitchFamily="34" charset="0"/>
+              </a:defRPr>
+            </a:lvl9pPr>
+          </a:lstStyle>
+          <a:p>
+            <a:pPr eaLnBrk="1" hangingPunct="1"/>
+            <a:endParaRPr lang="en-IN" altLang="en-US"/>
+          </a:p>
+        </p:txBody>
+      </p:sp>
+      <p:sp>
+        <p:nvSpPr>
+          <p:cNvPr id="20" name="Rectangle 19"/>
+          <p:cNvSpPr>
+            <a:spLocks noChangeArrowheads="1"/>
+          </p:cNvSpPr>
+          <p:nvPr/>
+        </p:nvSpPr>
+        <p:spPr bwMode="auto">
+          <a:xfrm>
+            <a:off x="417881" y="3447004"/>
+            <a:ext cx="2506072" cy="794480"/>
+          </a:xfrm>
+          <a:prstGeom prst="rect">
+            <a:avLst/>
+          </a:prstGeom>
+          <a:noFill/>
+          <a:ln w="9525">
+            <a:solidFill>
+              <a:schemeClr val="tx1"/>
+            </a:solidFill>
+            <a:miter lim="800000"/>
+            <a:headEnd/>
+            <a:tailEnd/>
+          </a:ln>
+          <a:effectLst/>
+          <a:extLst>
+            <a:ext uri="{909E8E84-426E-40DD-AFC4-6F175D3DCCD1}">
+              <a14:hiddenFill xmlns:a14="http://schemas.microsoft.com/office/drawing/2010/main">
+                <a:solidFill>
+                  <a:schemeClr val="accent1"/>
+                </a:solidFill>
+              </a14:hiddenFill>
+            </a:ext>
+            <a:ext uri="{AF507438-7753-43E0-B8FC-AC1667EBCBE1}">
+              <a14:hiddenEffects xmlns:a14="http://schemas.microsoft.com/office/drawing/2010/main">
+                <a:effectLst>
+                  <a:outerShdw dist="35921" dir="2700000" algn="ctr" rotWithShape="0">
+                    <a:schemeClr val="bg2"/>
+                  </a:outerShdw>
+                </a:effectLst>
+              </a14:hiddenEffects>
+            </a:ext>
+          </a:extLst>
+        </p:spPr>
+        <p:txBody>
+          <a:bodyPr wrap="none" anchor="ctr"/>
+          <a:lstStyle>
+            <a:defPPr>
+              <a:defRPr lang="en-US"/>
+            </a:defPPr>
+            <a:lvl1pPr algn="l" rtl="0" fontAlgn="base">
+              <a:spcBef>
+                <a:spcPct val="0"/>
+              </a:spcBef>
+              <a:spcAft>
+                <a:spcPct val="0"/>
+              </a:spcAft>
+              <a:defRPr kern="1200">
+                <a:solidFill>
+                  <a:schemeClr val="tx1"/>
+                </a:solidFill>
+                <a:latin typeface="Arial" panose="020B0604020202020204" pitchFamily="34" charset="0"/>
+                <a:ea typeface="+mn-ea"/>
+                <a:cs typeface="Arial" panose="020B0604020202020204" pitchFamily="34" charset="0"/>
+              </a:defRPr>
+            </a:lvl1pPr>
+            <a:lvl2pPr marL="457200" algn="l" rtl="0" fontAlgn="base">
+              <a:spcBef>
+                <a:spcPct val="0"/>
+              </a:spcBef>
+              <a:spcAft>
+                <a:spcPct val="0"/>
+              </a:spcAft>
+              <a:defRPr kern="1200">
+                <a:solidFill>
+                  <a:schemeClr val="tx1"/>
+                </a:solidFill>
+                <a:latin typeface="Arial" panose="020B0604020202020204" pitchFamily="34" charset="0"/>
+                <a:ea typeface="+mn-ea"/>
+                <a:cs typeface="Arial" panose="020B0604020202020204" pitchFamily="34" charset="0"/>
+              </a:defRPr>
+            </a:lvl2pPr>
+            <a:lvl3pPr marL="914400" algn="l" rtl="0" fontAlgn="base">
+              <a:spcBef>
+                <a:spcPct val="0"/>
+              </a:spcBef>
+              <a:spcAft>
+                <a:spcPct val="0"/>
+              </a:spcAft>
+              <a:defRPr kern="1200">
+                <a:solidFill>
+                  <a:schemeClr val="tx1"/>
+                </a:solidFill>
+                <a:latin typeface="Arial" panose="020B0604020202020204" pitchFamily="34" charset="0"/>
+                <a:ea typeface="+mn-ea"/>
+                <a:cs typeface="Arial" panose="020B0604020202020204" pitchFamily="34" charset="0"/>
+              </a:defRPr>
+            </a:lvl3pPr>
+            <a:lvl4pPr marL="1371600" algn="l" rtl="0" fontAlgn="base">
+              <a:spcBef>
+                <a:spcPct val="0"/>
+              </a:spcBef>
+              <a:spcAft>
+                <a:spcPct val="0"/>
+              </a:spcAft>
+              <a:defRPr kern="1200">
+                <a:solidFill>
+                  <a:schemeClr val="tx1"/>
+                </a:solidFill>
+                <a:latin typeface="Arial" panose="020B0604020202020204" pitchFamily="34" charset="0"/>
+                <a:ea typeface="+mn-ea"/>
+                <a:cs typeface="Arial" panose="020B0604020202020204" pitchFamily="34" charset="0"/>
+              </a:defRPr>
+            </a:lvl4pPr>
+            <a:lvl5pPr marL="1828800" algn="l" rtl="0" fontAlgn="base">
+              <a:spcBef>
+                <a:spcPct val="0"/>
+              </a:spcBef>
+              <a:spcAft>
+                <a:spcPct val="0"/>
+              </a:spcAft>
+              <a:defRPr kern="1200">
+                <a:solidFill>
+                  <a:schemeClr val="tx1"/>
+                </a:solidFill>
+                <a:latin typeface="Arial" panose="020B0604020202020204" pitchFamily="34" charset="0"/>
+                <a:ea typeface="+mn-ea"/>
+                <a:cs typeface="Arial" panose="020B0604020202020204" pitchFamily="34" charset="0"/>
+              </a:defRPr>
+            </a:lvl5pPr>
+            <a:lvl6pPr marL="2286000" algn="l" defTabSz="914400" rtl="0" eaLnBrk="1" latinLnBrk="0" hangingPunct="1">
+              <a:defRPr kern="1200">
+                <a:solidFill>
+                  <a:schemeClr val="tx1"/>
+                </a:solidFill>
+                <a:latin typeface="Arial" panose="020B0604020202020204" pitchFamily="34" charset="0"/>
+                <a:ea typeface="+mn-ea"/>
+                <a:cs typeface="Arial" panose="020B0604020202020204" pitchFamily="34" charset="0"/>
+              </a:defRPr>
+            </a:lvl6pPr>
+            <a:lvl7pPr marL="2743200" algn="l" defTabSz="914400" rtl="0" eaLnBrk="1" latinLnBrk="0" hangingPunct="1">
+              <a:defRPr kern="1200">
+                <a:solidFill>
+                  <a:schemeClr val="tx1"/>
+                </a:solidFill>
+                <a:latin typeface="Arial" panose="020B0604020202020204" pitchFamily="34" charset="0"/>
+                <a:ea typeface="+mn-ea"/>
+                <a:cs typeface="Arial" panose="020B0604020202020204" pitchFamily="34" charset="0"/>
+              </a:defRPr>
+            </a:lvl7pPr>
+            <a:lvl8pPr marL="3200400" algn="l" defTabSz="914400" rtl="0" eaLnBrk="1" latinLnBrk="0" hangingPunct="1">
+              <a:defRPr kern="1200">
+                <a:solidFill>
+                  <a:schemeClr val="tx1"/>
+                </a:solidFill>
+                <a:latin typeface="Arial" panose="020B0604020202020204" pitchFamily="34" charset="0"/>
+                <a:ea typeface="+mn-ea"/>
+                <a:cs typeface="Arial" panose="020B0604020202020204" pitchFamily="34" charset="0"/>
+              </a:defRPr>
+            </a:lvl8pPr>
+            <a:lvl9pPr marL="3657600" algn="l" defTabSz="914400" rtl="0" eaLnBrk="1" latinLnBrk="0" hangingPunct="1">
+              <a:defRPr kern="1200">
+                <a:solidFill>
+                  <a:schemeClr val="tx1"/>
+                </a:solidFill>
+                <a:latin typeface="Arial" panose="020B0604020202020204" pitchFamily="34" charset="0"/>
+                <a:ea typeface="+mn-ea"/>
+                <a:cs typeface="Arial" panose="020B0604020202020204" pitchFamily="34" charset="0"/>
+              </a:defRPr>
+            </a:lvl9pPr>
+          </a:lstStyle>
+          <a:p>
+            <a:pPr eaLnBrk="1" hangingPunct="1"/>
+            <a:endParaRPr lang="en-IN" altLang="en-US"/>
+          </a:p>
+        </p:txBody>
+      </p:sp>
+      <p:cxnSp>
+        <p:nvCxnSpPr>
+          <p:cNvPr id="21" name="AutoShape 11"/>
+          <p:cNvCxnSpPr>
+            <a:cxnSpLocks noChangeShapeType="1"/>
+          </p:cNvCxnSpPr>
+          <p:nvPr/>
+        </p:nvCxnSpPr>
+        <p:spPr bwMode="auto">
+          <a:xfrm>
+            <a:off x="2914207" y="3766848"/>
+            <a:ext cx="2400300" cy="1385331"/>
+          </a:xfrm>
+          <a:prstGeom prst="curvedConnector3">
+            <a:avLst>
+              <a:gd name="adj1" fmla="val 50000"/>
+            </a:avLst>
+          </a:prstGeom>
+          <a:noFill/>
+          <a:ln w="9525">
+            <a:solidFill>
+              <a:schemeClr val="tx1"/>
+            </a:solidFill>
+            <a:round/>
+            <a:headEnd/>
+            <a:tailEnd type="triangle" w="med" len="med"/>
+          </a:ln>
+          <a:effectLst/>
+          <a:extLst>
+            <a:ext uri="{909E8E84-426E-40DD-AFC4-6F175D3DCCD1}">
+              <a14:hiddenFill xmlns:a14="http://schemas.microsoft.com/office/drawing/2010/main">
+                <a:noFill/>
+              </a14:hiddenFill>
+            </a:ext>
+            <a:ext uri="{AF507438-7753-43E0-B8FC-AC1667EBCBE1}">
+              <a14:hiddenEffects xmlns:a14="http://schemas.microsoft.com/office/drawing/2010/main">
+                <a:effectLst>
+                  <a:outerShdw dist="35921" dir="2700000" algn="ctr" rotWithShape="0">
+                    <a:schemeClr val="bg2"/>
+                  </a:outerShdw>
+                </a:effectLst>
+              </a14:hiddenEffects>
+            </a:ext>
+          </a:extLst>
+        </p:spPr>
+      </p:cxnSp>
+      <p:sp>
+        <p:nvSpPr>
+          <p:cNvPr id="23" name="Rectangle 22"/>
+          <p:cNvSpPr>
+            <a:spLocks noChangeArrowheads="1"/>
+          </p:cNvSpPr>
+          <p:nvPr/>
+        </p:nvSpPr>
+        <p:spPr bwMode="auto">
+          <a:xfrm>
+            <a:off x="5314507" y="4958397"/>
+            <a:ext cx="2506072" cy="469483"/>
+          </a:xfrm>
+          <a:prstGeom prst="rect">
+            <a:avLst/>
+          </a:prstGeom>
+          <a:noFill/>
+          <a:ln w="9525">
+            <a:solidFill>
+              <a:schemeClr val="tx1"/>
+            </a:solidFill>
+            <a:miter lim="800000"/>
+            <a:headEnd/>
+            <a:tailEnd/>
+          </a:ln>
+          <a:effectLst/>
+          <a:extLst>
+            <a:ext uri="{909E8E84-426E-40DD-AFC4-6F175D3DCCD1}">
+              <a14:hiddenFill xmlns:a14="http://schemas.microsoft.com/office/drawing/2010/main">
+                <a:solidFill>
+                  <a:schemeClr val="accent1"/>
+                </a:solidFill>
+              </a14:hiddenFill>
+            </a:ext>
+            <a:ext uri="{AF507438-7753-43E0-B8FC-AC1667EBCBE1}">
+              <a14:hiddenEffects xmlns:a14="http://schemas.microsoft.com/office/drawing/2010/main">
+                <a:effectLst>
+                  <a:outerShdw dist="35921" dir="2700000" algn="ctr" rotWithShape="0">
+                    <a:schemeClr val="bg2"/>
+                  </a:outerShdw>
+                </a:effectLst>
+              </a14:hiddenEffects>
+            </a:ext>
+          </a:extLst>
+        </p:spPr>
+        <p:txBody>
+          <a:bodyPr wrap="none" anchor="ctr"/>
+          <a:lstStyle>
+            <a:defPPr>
+              <a:defRPr lang="en-US"/>
+            </a:defPPr>
+            <a:lvl1pPr algn="l" rtl="0" fontAlgn="base">
+              <a:spcBef>
+                <a:spcPct val="0"/>
+              </a:spcBef>
+              <a:spcAft>
+                <a:spcPct val="0"/>
+              </a:spcAft>
+              <a:defRPr kern="1200">
+                <a:solidFill>
+                  <a:schemeClr val="tx1"/>
+                </a:solidFill>
+                <a:latin typeface="Arial" panose="020B0604020202020204" pitchFamily="34" charset="0"/>
+                <a:ea typeface="+mn-ea"/>
+                <a:cs typeface="Arial" panose="020B0604020202020204" pitchFamily="34" charset="0"/>
+              </a:defRPr>
+            </a:lvl1pPr>
+            <a:lvl2pPr marL="457200" algn="l" rtl="0" fontAlgn="base">
+              <a:spcBef>
+                <a:spcPct val="0"/>
+              </a:spcBef>
+              <a:spcAft>
+                <a:spcPct val="0"/>
+              </a:spcAft>
+              <a:defRPr kern="1200">
+                <a:solidFill>
+                  <a:schemeClr val="tx1"/>
+                </a:solidFill>
+                <a:latin typeface="Arial" panose="020B0604020202020204" pitchFamily="34" charset="0"/>
+                <a:ea typeface="+mn-ea"/>
+                <a:cs typeface="Arial" panose="020B0604020202020204" pitchFamily="34" charset="0"/>
+              </a:defRPr>
+            </a:lvl2pPr>
+            <a:lvl3pPr marL="914400" algn="l" rtl="0" fontAlgn="base">
+              <a:spcBef>
+                <a:spcPct val="0"/>
+              </a:spcBef>
+              <a:spcAft>
+                <a:spcPct val="0"/>
+              </a:spcAft>
+              <a:defRPr kern="1200">
+                <a:solidFill>
+                  <a:schemeClr val="tx1"/>
+                </a:solidFill>
+                <a:latin typeface="Arial" panose="020B0604020202020204" pitchFamily="34" charset="0"/>
+                <a:ea typeface="+mn-ea"/>
+                <a:cs typeface="Arial" panose="020B0604020202020204" pitchFamily="34" charset="0"/>
+              </a:defRPr>
+            </a:lvl3pPr>
+            <a:lvl4pPr marL="1371600" algn="l" rtl="0" fontAlgn="base">
+              <a:spcBef>
+                <a:spcPct val="0"/>
+              </a:spcBef>
+              <a:spcAft>
+                <a:spcPct val="0"/>
+              </a:spcAft>
+              <a:defRPr kern="1200">
+                <a:solidFill>
+                  <a:schemeClr val="tx1"/>
+                </a:solidFill>
+                <a:latin typeface="Arial" panose="020B0604020202020204" pitchFamily="34" charset="0"/>
+                <a:ea typeface="+mn-ea"/>
+                <a:cs typeface="Arial" panose="020B0604020202020204" pitchFamily="34" charset="0"/>
+              </a:defRPr>
+            </a:lvl4pPr>
+            <a:lvl5pPr marL="1828800" algn="l" rtl="0" fontAlgn="base">
+              <a:spcBef>
+                <a:spcPct val="0"/>
+              </a:spcBef>
+              <a:spcAft>
+                <a:spcPct val="0"/>
+              </a:spcAft>
+              <a:defRPr kern="1200">
+                <a:solidFill>
+                  <a:schemeClr val="tx1"/>
+                </a:solidFill>
+                <a:latin typeface="Arial" panose="020B0604020202020204" pitchFamily="34" charset="0"/>
+                <a:ea typeface="+mn-ea"/>
+                <a:cs typeface="Arial" panose="020B0604020202020204" pitchFamily="34" charset="0"/>
+              </a:defRPr>
+            </a:lvl5pPr>
+            <a:lvl6pPr marL="2286000" algn="l" defTabSz="914400" rtl="0" eaLnBrk="1" latinLnBrk="0" hangingPunct="1">
+              <a:defRPr kern="1200">
+                <a:solidFill>
+                  <a:schemeClr val="tx1"/>
+                </a:solidFill>
+                <a:latin typeface="Arial" panose="020B0604020202020204" pitchFamily="34" charset="0"/>
+                <a:ea typeface="+mn-ea"/>
+                <a:cs typeface="Arial" panose="020B0604020202020204" pitchFamily="34" charset="0"/>
+              </a:defRPr>
+            </a:lvl6pPr>
+            <a:lvl7pPr marL="2743200" algn="l" defTabSz="914400" rtl="0" eaLnBrk="1" latinLnBrk="0" hangingPunct="1">
+              <a:defRPr kern="1200">
+                <a:solidFill>
+                  <a:schemeClr val="tx1"/>
+                </a:solidFill>
+                <a:latin typeface="Arial" panose="020B0604020202020204" pitchFamily="34" charset="0"/>
+                <a:ea typeface="+mn-ea"/>
+                <a:cs typeface="Arial" panose="020B0604020202020204" pitchFamily="34" charset="0"/>
+              </a:defRPr>
+            </a:lvl7pPr>
+            <a:lvl8pPr marL="3200400" algn="l" defTabSz="914400" rtl="0" eaLnBrk="1" latinLnBrk="0" hangingPunct="1">
+              <a:defRPr kern="1200">
+                <a:solidFill>
+                  <a:schemeClr val="tx1"/>
+                </a:solidFill>
+                <a:latin typeface="Arial" panose="020B0604020202020204" pitchFamily="34" charset="0"/>
+                <a:ea typeface="+mn-ea"/>
+                <a:cs typeface="Arial" panose="020B0604020202020204" pitchFamily="34" charset="0"/>
+              </a:defRPr>
+            </a:lvl8pPr>
+            <a:lvl9pPr marL="3657600" algn="l" defTabSz="914400" rtl="0" eaLnBrk="1" latinLnBrk="0" hangingPunct="1">
+              <a:defRPr kern="1200">
+                <a:solidFill>
+                  <a:schemeClr val="tx1"/>
+                </a:solidFill>
+                <a:latin typeface="Arial" panose="020B0604020202020204" pitchFamily="34" charset="0"/>
+                <a:ea typeface="+mn-ea"/>
+                <a:cs typeface="Arial" panose="020B0604020202020204" pitchFamily="34" charset="0"/>
+              </a:defRPr>
+            </a:lvl9pPr>
+          </a:lstStyle>
+          <a:p>
+            <a:pPr eaLnBrk="1" hangingPunct="1"/>
+            <a:endParaRPr lang="en-IN" altLang="en-US"/>
+          </a:p>
+        </p:txBody>
+      </p:sp>
     </p:spTree>
     <p:extLst>
       <p:ext uri="{BB962C8B-B14F-4D97-AF65-F5344CB8AC3E}">
-        <p14:creationId xmlns:p14="http://schemas.microsoft.com/office/powerpoint/2010/main" val="819764304"/>
+        <p14:creationId xmlns:p14="http://schemas.microsoft.com/office/powerpoint/2010/main" val="1686245459"/>
       </p:ext>
     </p:extLst>
   </p:cSld>
@@ -13367,7 +14136,7 @@
         <p:spPr>
           <a:xfrm>
             <a:off x="554470" y="1596831"/>
-            <a:ext cx="8306898" cy="3970318"/>
+            <a:ext cx="8306898" cy="4524315"/>
           </a:xfrm>
           <a:prstGeom prst="rect">
             <a:avLst/>
@@ -13474,8 +14243,25 @@
             </a:r>
             <a:r>
               <a:rPr lang="en-US" b="1" dirty="0" smtClean="0"/>
-              <a:t>)</a:t>
-            </a:r>
+              <a:t>); </a:t>
+            </a:r>
+            <a:r>
+              <a:rPr lang="en-US" dirty="0" smtClean="0"/>
+              <a:t> In this method if you want to continue with the other filters in the chain add al the last code line the following </a:t>
+            </a:r>
+            <a:r>
+              <a:rPr lang="en-US" smtClean="0"/>
+              <a:t>instrunction </a:t>
+            </a:r>
+            <a:r>
+              <a:rPr lang="en-US" b="1" dirty="0" err="1"/>
+              <a:t>chain.doFilter</a:t>
+            </a:r>
+            <a:r>
+              <a:rPr lang="en-US" b="1" dirty="0"/>
+              <a:t>(request, response);</a:t>
+            </a:r>
+            <a:endParaRPr lang="en-US" b="1" dirty="0" smtClean="0"/>
           </a:p>
           <a:p>
             <a:pPr lvl="1"/>
@@ -17633,11 +18419,7 @@
           <a:p>
             <a:r>
               <a:rPr lang="en-US" dirty="0" smtClean="0"/>
-              <a:t>Example </a:t>
-            </a:r>
-            <a:r>
-              <a:rPr lang="en-US" dirty="0" smtClean="0"/>
-              <a:t>of </a:t>
+              <a:t>Example of </a:t>
             </a:r>
             <a:r>
               <a:rPr lang="en-US" b="1" dirty="0" smtClean="0"/>
@@ -18445,15 +19227,6 @@
 </file>
 
 <file path=customXml/item1.xml><?xml version="1.0" encoding="utf-8"?>
-<p:properties xmlns:p="http://schemas.microsoft.com/office/2006/metadata/properties" xmlns:xsi="http://www.w3.org/2001/XMLSchema-instance" xmlns:pc="http://schemas.microsoft.com/office/infopath/2007/PartnerControls">
-  <documentManagement>
-    <PublishingExpirationDate xmlns="http://schemas.microsoft.com/sharepoint/v3" xsi:nil="true"/>
-    <PublishingStartDate xmlns="http://schemas.microsoft.com/sharepoint/v3" xsi:nil="true"/>
-  </documentManagement>
-</p:properties>
-</file>
-
-<file path=customXml/item2.xml><?xml version="1.0" encoding="utf-8"?>
 <ct:contentTypeSchema xmlns:ct="http://schemas.microsoft.com/office/2006/metadata/contentType" xmlns:ma="http://schemas.microsoft.com/office/2006/metadata/properties/metaAttributes" ct:_="" ma:_="" ma:contentTypeName="Document" ma:contentTypeID="0x0101002EAB9993CCBF73478E12853278F3FB5C" ma:contentTypeVersion="1" ma:contentTypeDescription="Create a new document." ma:contentTypeScope="" ma:versionID="4db10d317033d09fed4d0297d17c663a">
   <xsd:schema xmlns:xsd="http://www.w3.org/2001/XMLSchema" xmlns:xs="http://www.w3.org/2001/XMLSchema" xmlns:p="http://schemas.microsoft.com/office/2006/metadata/properties" xmlns:ns1="http://schemas.microsoft.com/sharepoint/v3" targetNamespace="http://schemas.microsoft.com/office/2006/metadata/properties" ma:root="true" ma:fieldsID="48c5b5cd9b8d25ff6dd15848836f4270" ns1:_="">
     <xsd:import namespace="http://schemas.microsoft.com/sharepoint/v3"/>
@@ -18585,7 +19358,7 @@
 </ct:contentTypeSchema>
 </file>
 
-<file path=customXml/item3.xml><?xml version="1.0" encoding="utf-8"?>
+<file path=customXml/item2.xml><?xml version="1.0" encoding="utf-8"?>
 <?mso-contentType ?>
 <FormTemplates xmlns="http://schemas.microsoft.com/sharepoint/v3/contenttype/forms">
   <Display>DocumentLibraryForm</Display>
@@ -18594,23 +19367,16 @@
 </FormTemplates>
 </file>
 
-<file path=customXml/itemProps1.xml><?xml version="1.0" encoding="utf-8"?>
-<ds:datastoreItem xmlns:ds="http://schemas.openxmlformats.org/officeDocument/2006/customXml" ds:itemID="{C1424CC9-255C-4972-B5F2-6F19B32F3DEA}">
-  <ds:schemaRefs>
-    <ds:schemaRef ds:uri="http://purl.org/dc/terms/"/>
-    <ds:schemaRef ds:uri="http://schemas.microsoft.com/office/infopath/2007/PartnerControls"/>
-    <ds:schemaRef ds:uri="http://schemas.microsoft.com/sharepoint/v3"/>
-    <ds:schemaRef ds:uri="http://schemas.microsoft.com/office/2006/documentManagement/types"/>
-    <ds:schemaRef ds:uri="http://purl.org/dc/dcmitype/"/>
-    <ds:schemaRef ds:uri="http://purl.org/dc/elements/1.1/"/>
-    <ds:schemaRef ds:uri="http://www.w3.org/XML/1998/namespace"/>
-    <ds:schemaRef ds:uri="http://schemas.openxmlformats.org/package/2006/metadata/core-properties"/>
-    <ds:schemaRef ds:uri="http://schemas.microsoft.com/office/2006/metadata/properties"/>
-  </ds:schemaRefs>
-</ds:datastoreItem>
+<file path=customXml/item3.xml><?xml version="1.0" encoding="utf-8"?>
+<p:properties xmlns:p="http://schemas.microsoft.com/office/2006/metadata/properties" xmlns:xsi="http://www.w3.org/2001/XMLSchema-instance" xmlns:pc="http://schemas.microsoft.com/office/infopath/2007/PartnerControls">
+  <documentManagement>
+    <PublishingExpirationDate xmlns="http://schemas.microsoft.com/sharepoint/v3" xsi:nil="true"/>
+    <PublishingStartDate xmlns="http://schemas.microsoft.com/sharepoint/v3" xsi:nil="true"/>
+  </documentManagement>
+</p:properties>
 </file>
 
-<file path=customXml/itemProps2.xml><?xml version="1.0" encoding="utf-8"?>
+<file path=customXml/itemProps1.xml><?xml version="1.0" encoding="utf-8"?>
 <ds:datastoreItem xmlns:ds="http://schemas.openxmlformats.org/officeDocument/2006/customXml" ds:itemID="{E29AC310-E4D3-4181-8DC8-8BCBD631C9E0}">
   <ds:schemaRefs>
     <ds:schemaRef ds:uri="http://schemas.microsoft.com/office/2006/metadata/contentType"/>
@@ -18628,10 +19394,26 @@
 </ds:datastoreItem>
 </file>
 
-<file path=customXml/itemProps3.xml><?xml version="1.0" encoding="utf-8"?>
+<file path=customXml/itemProps2.xml><?xml version="1.0" encoding="utf-8"?>
 <ds:datastoreItem xmlns:ds="http://schemas.openxmlformats.org/officeDocument/2006/customXml" ds:itemID="{B3E8851E-A513-4DE1-BFEA-60B7444A3522}">
   <ds:schemaRefs>
     <ds:schemaRef ds:uri="http://schemas.microsoft.com/sharepoint/v3/contenttype/forms"/>
   </ds:schemaRefs>
 </ds:datastoreItem>
+</file>
+
+<file path=customXml/itemProps3.xml><?xml version="1.0" encoding="utf-8"?>
+<ds:datastoreItem xmlns:ds="http://schemas.openxmlformats.org/officeDocument/2006/customXml" ds:itemID="{C1424CC9-255C-4972-B5F2-6F19B32F3DEA}">
+  <ds:schemaRefs>
+    <ds:schemaRef ds:uri="http://purl.org/dc/terms/"/>
+    <ds:schemaRef ds:uri="http://schemas.microsoft.com/office/infopath/2007/PartnerControls"/>
+    <ds:schemaRef ds:uri="http://schemas.microsoft.com/sharepoint/v3"/>
+    <ds:schemaRef ds:uri="http://schemas.microsoft.com/office/2006/documentManagement/types"/>
+    <ds:schemaRef ds:uri="http://purl.org/dc/dcmitype/"/>
+    <ds:schemaRef ds:uri="http://purl.org/dc/elements/1.1/"/>
+    <ds:schemaRef ds:uri="http://www.w3.org/XML/1998/namespace"/>
+    <ds:schemaRef ds:uri="http://schemas.openxmlformats.org/package/2006/metadata/core-properties"/>
+    <ds:schemaRef ds:uri="http://schemas.microsoft.com/office/2006/metadata/properties"/>
+  </ds:schemaRefs>
+</ds:datastoreItem>
 </file>
</xml_diff>